<commit_message>
docs with solution for all problem stmts
</commit_message>
<xml_diff>
--- a/NYC Parking Tickets EDA/FayizMayamVeettil_DDA1730041_main.pptx
+++ b/NYC Parking Tickets EDA/FayizMayamVeettil_DDA1730041_main.pptx
@@ -5,7 +5,7 @@
     <p:sldMasterId id="2147483660" r:id="rId1"/>
   </p:sldMasterIdLst>
   <p:notesMasterIdLst>
-    <p:notesMasterId r:id="rId22"/>
+    <p:notesMasterId r:id="rId24"/>
   </p:notesMasterIdLst>
   <p:sldIdLst>
     <p:sldId id="256" r:id="rId2"/>
@@ -28,6 +28,8 @@
     <p:sldId id="331" r:id="rId19"/>
     <p:sldId id="326" r:id="rId20"/>
     <p:sldId id="332" r:id="rId21"/>
+    <p:sldId id="333" r:id="rId22"/>
+    <p:sldId id="334" r:id="rId23"/>
   </p:sldIdLst>
   <p:sldSz cx="12192000" cy="6858000"/>
   <p:notesSz cx="6858000" cy="9144000"/>
@@ -137,10 +139,6 @@
 </p:presentation>
 </file>
 
-<file path=ppt/revisionInfo.xml><?xml version="1.0" encoding="utf-8"?>
-<p1510:revInfo xmlns:a="http://schemas.openxmlformats.org/drawingml/2006/main" xmlns:r="http://schemas.openxmlformats.org/officeDocument/2006/relationships" xmlns:p1510="http://schemas.microsoft.com/office/powerpoint/2015/10/main"/>
-</file>
-
 <file path=ppt/notesMasters/notesMaster1.xml><?xml version="1.0" encoding="utf-8"?>
 <p:notesMaster xmlns:a="http://schemas.openxmlformats.org/drawingml/2006/main" xmlns:r="http://schemas.openxmlformats.org/officeDocument/2006/relationships" xmlns:p="http://schemas.openxmlformats.org/presentationml/2006/main">
   <p:cSld>
@@ -223,7 +221,7 @@
           <a:p>
             <a:fld id="{2E309023-AF2B-4043-B228-F191CADC9BB1}" type="datetimeFigureOut">
               <a:rPr lang="en-IN" smtClean="0"/>
-              <a:t>14-07-2018</a:t>
+              <a:t>15-07-2018</a:t>
             </a:fld>
             <a:endParaRPr lang="en-IN"/>
           </a:p>
@@ -622,7 +620,7 @@
           <a:p>
             <a:fld id="{70C018FE-C8D6-4A9C-A702-41F1E0C1C452}" type="datetimeFigureOut">
               <a:rPr lang="en-IN" smtClean="0"/>
-              <a:t>14-07-2018</a:t>
+              <a:t>15-07-2018</a:t>
             </a:fld>
             <a:endParaRPr lang="en-IN"/>
           </a:p>
@@ -792,7 +790,7 @@
           <a:p>
             <a:fld id="{70C018FE-C8D6-4A9C-A702-41F1E0C1C452}" type="datetimeFigureOut">
               <a:rPr lang="en-IN" smtClean="0"/>
-              <a:t>14-07-2018</a:t>
+              <a:t>15-07-2018</a:t>
             </a:fld>
             <a:endParaRPr lang="en-IN"/>
           </a:p>
@@ -972,7 +970,7 @@
           <a:p>
             <a:fld id="{70C018FE-C8D6-4A9C-A702-41F1E0C1C452}" type="datetimeFigureOut">
               <a:rPr lang="en-IN" smtClean="0"/>
-              <a:t>14-07-2018</a:t>
+              <a:t>15-07-2018</a:t>
             </a:fld>
             <a:endParaRPr lang="en-IN"/>
           </a:p>
@@ -1404,7 +1402,7 @@
           <a:p>
             <a:fld id="{70C018FE-C8D6-4A9C-A702-41F1E0C1C452}" type="datetimeFigureOut">
               <a:rPr lang="en-IN" smtClean="0"/>
-              <a:t>14-07-2018</a:t>
+              <a:t>15-07-2018</a:t>
             </a:fld>
             <a:endParaRPr lang="en-IN"/>
           </a:p>
@@ -1636,7 +1634,7 @@
           <a:p>
             <a:fld id="{70C018FE-C8D6-4A9C-A702-41F1E0C1C452}" type="datetimeFigureOut">
               <a:rPr lang="en-IN" smtClean="0"/>
-              <a:t>14-07-2018</a:t>
+              <a:t>15-07-2018</a:t>
             </a:fld>
             <a:endParaRPr lang="en-IN"/>
           </a:p>
@@ -2003,7 +2001,7 @@
           <a:p>
             <a:fld id="{70C018FE-C8D6-4A9C-A702-41F1E0C1C452}" type="datetimeFigureOut">
               <a:rPr lang="en-IN" smtClean="0"/>
-              <a:t>14-07-2018</a:t>
+              <a:t>15-07-2018</a:t>
             </a:fld>
             <a:endParaRPr lang="en-IN"/>
           </a:p>
@@ -2121,7 +2119,7 @@
           <a:p>
             <a:fld id="{70C018FE-C8D6-4A9C-A702-41F1E0C1C452}" type="datetimeFigureOut">
               <a:rPr lang="en-IN" smtClean="0"/>
-              <a:t>14-07-2018</a:t>
+              <a:t>15-07-2018</a:t>
             </a:fld>
             <a:endParaRPr lang="en-IN"/>
           </a:p>
@@ -2216,7 +2214,7 @@
           <a:p>
             <a:fld id="{70C018FE-C8D6-4A9C-A702-41F1E0C1C452}" type="datetimeFigureOut">
               <a:rPr lang="en-IN" smtClean="0"/>
-              <a:t>14-07-2018</a:t>
+              <a:t>15-07-2018</a:t>
             </a:fld>
             <a:endParaRPr lang="en-IN"/>
           </a:p>
@@ -2492,7 +2490,7 @@
           <a:p>
             <a:fld id="{70C018FE-C8D6-4A9C-A702-41F1E0C1C452}" type="datetimeFigureOut">
               <a:rPr lang="en-IN" smtClean="0"/>
-              <a:t>14-07-2018</a:t>
+              <a:t>15-07-2018</a:t>
             </a:fld>
             <a:endParaRPr lang="en-IN"/>
           </a:p>
@@ -2749,7 +2747,7 @@
           <a:p>
             <a:fld id="{70C018FE-C8D6-4A9C-A702-41F1E0C1C452}" type="datetimeFigureOut">
               <a:rPr lang="en-IN" smtClean="0"/>
-              <a:t>14-07-2018</a:t>
+              <a:t>15-07-2018</a:t>
             </a:fld>
             <a:endParaRPr lang="en-IN"/>
           </a:p>
@@ -2960,7 +2958,7 @@
           <a:p>
             <a:fld id="{70C018FE-C8D6-4A9C-A702-41F1E0C1C452}" type="datetimeFigureOut">
               <a:rPr lang="en-IN" smtClean="0"/>
-              <a:t>14-07-2018</a:t>
+              <a:t>15-07-2018</a:t>
             </a:fld>
             <a:endParaRPr lang="en-IN" dirty="0"/>
           </a:p>
@@ -4820,7 +4818,7 @@
         <p:spPr>
           <a:xfrm>
             <a:off x="196206" y="1797891"/>
-            <a:ext cx="11799587" cy="1846659"/>
+            <a:ext cx="11799587" cy="2062103"/>
           </a:xfrm>
           <a:prstGeom prst="rect">
             <a:avLst/>
@@ -4838,15 +4836,26 @@
             </a:pPr>
             <a:r>
               <a:rPr lang="en-US" b="1" dirty="0"/>
-              <a:t>Find the violation code frequency across 3 precincts which have issued the most number of tickets - do these precinct 	zones have an exceptionally high frequency of certain violation codes? Are these codes common across precincts?</a:t>
-            </a:r>
-          </a:p>
-          <a:p>
-            <a:pPr marL="457200" lvl="2">
-              <a:lnSpc>
-                <a:spcPct val="200000"/>
-              </a:lnSpc>
-            </a:pPr>
+              <a:t>Find the violation code frequency across 3 precincts which have issued the most number of tickets - do these precinct zones have an exceptionally high frequency of certain violation codes? Are these codes common across precincts?</a:t>
+            </a:r>
+          </a:p>
+          <a:p>
+            <a:pPr marL="457200" lvl="2"/>
+            <a:r>
+              <a:rPr lang="en-US" sz="1400" b="1" dirty="0">
+                <a:solidFill>
+                  <a:schemeClr val="tx1">
+                    <a:lumMod val="50000"/>
+                    <a:lumOff val="50000"/>
+                  </a:schemeClr>
+                </a:solidFill>
+                <a:latin typeface="Lato"/>
+              </a:rPr>
+              <a:t>	-	Assumption: Precincts Code 0 is considered as one of the Precincts</a:t>
+            </a:r>
+          </a:p>
+          <a:p>
+            <a:pPr marL="457200" lvl="2"/>
             <a:r>
               <a:rPr lang="en-US" sz="1400" b="1" dirty="0">
                 <a:solidFill>
@@ -4874,6 +4883,18 @@
               </a:rPr>
               <a:t>	-	No consistency in violation codes however code 14, 46 are most common in all year/precincts</a:t>
             </a:r>
+          </a:p>
+          <a:p>
+            <a:pPr marL="457200" lvl="2"/>
+            <a:endParaRPr lang="en-US" sz="1400" b="1" dirty="0">
+              <a:solidFill>
+                <a:schemeClr val="tx1">
+                  <a:lumMod val="50000"/>
+                  <a:lumOff val="50000"/>
+                </a:schemeClr>
+              </a:solidFill>
+              <a:latin typeface="Lato"/>
+            </a:endParaRPr>
           </a:p>
           <a:p>
             <a:pPr marL="457200" lvl="2"/>
@@ -5132,7 +5153,7 @@
         </p:blipFill>
         <p:spPr>
           <a:xfrm>
-            <a:off x="1065684" y="2681761"/>
+            <a:off x="1458876" y="2672617"/>
             <a:ext cx="4248610" cy="3903450"/>
           </a:xfrm>
           <a:prstGeom prst="rect">
@@ -5162,7 +5183,7 @@
         </p:blipFill>
         <p:spPr>
           <a:xfrm>
-            <a:off x="6045197" y="2681761"/>
+            <a:off x="6438389" y="2672617"/>
             <a:ext cx="4382480" cy="3903450"/>
           </a:xfrm>
           <a:prstGeom prst="rect">
@@ -5369,8 +5390,8 @@
         </p:blipFill>
         <p:spPr>
           <a:xfrm>
-            <a:off x="1033786" y="2612254"/>
-            <a:ext cx="3109852" cy="4125151"/>
+            <a:off x="1234954" y="2619326"/>
+            <a:ext cx="3028260" cy="4016921"/>
           </a:xfrm>
           <a:prstGeom prst="rect">
             <a:avLst/>
@@ -5399,8 +5420,8 @@
         </p:blipFill>
         <p:spPr>
           <a:xfrm>
-            <a:off x="4424464" y="2612254"/>
-            <a:ext cx="3083553" cy="4111404"/>
+            <a:off x="4625633" y="2619326"/>
+            <a:ext cx="3013828" cy="4018437"/>
           </a:xfrm>
           <a:prstGeom prst="rect">
             <a:avLst/>
@@ -5429,14 +5450,50 @@
         </p:blipFill>
         <p:spPr>
           <a:xfrm>
-            <a:off x="7788843" y="2605182"/>
-            <a:ext cx="3089695" cy="4114257"/>
+            <a:off x="7990011" y="2612254"/>
+            <a:ext cx="3021909" cy="4023993"/>
           </a:xfrm>
           <a:prstGeom prst="rect">
             <a:avLst/>
           </a:prstGeom>
         </p:spPr>
       </p:pic>
+      <p:sp>
+        <p:nvSpPr>
+          <p:cNvPr id="9" name="TextBox 8">
+            <a:extLst>
+              <a:ext uri="{FF2B5EF4-FFF2-40B4-BE49-F238E27FC236}">
+                <a16:creationId xmlns:a16="http://schemas.microsoft.com/office/drawing/2014/main" id="{E6F0EF1E-2BFE-4F51-B427-D4974262BB7C}"/>
+              </a:ext>
+            </a:extLst>
+          </p:cNvPr>
+          <p:cNvSpPr txBox="1"/>
+          <p:nvPr/>
+        </p:nvSpPr>
+        <p:spPr>
+          <a:xfrm>
+            <a:off x="4996464" y="6636247"/>
+            <a:ext cx="7128480" cy="246221"/>
+          </a:xfrm>
+          <a:prstGeom prst="rect">
+            <a:avLst/>
+          </a:prstGeom>
+          <a:noFill/>
+        </p:spPr>
+        <p:txBody>
+          <a:bodyPr wrap="square" rtlCol="0">
+            <a:spAutoFit/>
+          </a:bodyPr>
+          <a:lstStyle/>
+          <a:p>
+            <a:pPr lvl="1"/>
+            <a:r>
+              <a:rPr lang="en-US" sz="1000" b="1" dirty="0"/>
+              <a:t>* NA's in the result sets are kept separately as it's not logical to add them in any of the time bin, unless otherwise specified</a:t>
+            </a:r>
+          </a:p>
+        </p:txBody>
+      </p:sp>
     </p:spTree>
     <p:extLst>
       <p:ext uri="{BB962C8B-B14F-4D97-AF65-F5344CB8AC3E}">
@@ -5618,6 +5675,132 @@
           </a:p>
         </p:txBody>
       </p:sp>
+      <p:pic>
+        <p:nvPicPr>
+          <p:cNvPr id="2" name="Picture 1">
+            <a:extLst>
+              <a:ext uri="{FF2B5EF4-FFF2-40B4-BE49-F238E27FC236}">
+                <a16:creationId xmlns:a16="http://schemas.microsoft.com/office/drawing/2014/main" id="{F246839D-7271-49E6-8C41-D4B1052B8173}"/>
+              </a:ext>
+            </a:extLst>
+          </p:cNvPr>
+          <p:cNvPicPr>
+            <a:picLocks noChangeAspect="1"/>
+          </p:cNvPicPr>
+          <p:nvPr/>
+        </p:nvPicPr>
+        <p:blipFill>
+          <a:blip r:embed="rId3"/>
+          <a:stretch>
+            <a:fillRect/>
+          </a:stretch>
+        </p:blipFill>
+        <p:spPr>
+          <a:xfrm>
+            <a:off x="1031578" y="2597577"/>
+            <a:ext cx="2960724" cy="4090073"/>
+          </a:xfrm>
+          <a:prstGeom prst="rect">
+            <a:avLst/>
+          </a:prstGeom>
+        </p:spPr>
+      </p:pic>
+      <p:pic>
+        <p:nvPicPr>
+          <p:cNvPr id="3" name="Picture 2">
+            <a:extLst>
+              <a:ext uri="{FF2B5EF4-FFF2-40B4-BE49-F238E27FC236}">
+                <a16:creationId xmlns:a16="http://schemas.microsoft.com/office/drawing/2014/main" id="{090DEA2C-691C-4BA0-82BC-0C28B77704D8}"/>
+              </a:ext>
+            </a:extLst>
+          </p:cNvPr>
+          <p:cNvPicPr>
+            <a:picLocks noChangeAspect="1"/>
+          </p:cNvPicPr>
+          <p:nvPr/>
+        </p:nvPicPr>
+        <p:blipFill>
+          <a:blip r:embed="rId4"/>
+          <a:stretch>
+            <a:fillRect/>
+          </a:stretch>
+        </p:blipFill>
+        <p:spPr>
+          <a:xfrm>
+            <a:off x="4618141" y="2597577"/>
+            <a:ext cx="2943311" cy="3072604"/>
+          </a:xfrm>
+          <a:prstGeom prst="rect">
+            <a:avLst/>
+          </a:prstGeom>
+        </p:spPr>
+      </p:pic>
+      <p:pic>
+        <p:nvPicPr>
+          <p:cNvPr id="4" name="Picture 3">
+            <a:extLst>
+              <a:ext uri="{FF2B5EF4-FFF2-40B4-BE49-F238E27FC236}">
+                <a16:creationId xmlns:a16="http://schemas.microsoft.com/office/drawing/2014/main" id="{4966B648-5627-4573-84D0-152A372CF18B}"/>
+              </a:ext>
+            </a:extLst>
+          </p:cNvPr>
+          <p:cNvPicPr>
+            <a:picLocks noChangeAspect="1"/>
+          </p:cNvPicPr>
+          <p:nvPr/>
+        </p:nvPicPr>
+        <p:blipFill>
+          <a:blip r:embed="rId5"/>
+          <a:stretch>
+            <a:fillRect/>
+          </a:stretch>
+        </p:blipFill>
+        <p:spPr>
+          <a:xfrm>
+            <a:off x="8187291" y="2605182"/>
+            <a:ext cx="2943311" cy="3064999"/>
+          </a:xfrm>
+          <a:prstGeom prst="rect">
+            <a:avLst/>
+          </a:prstGeom>
+        </p:spPr>
+      </p:pic>
+      <p:sp>
+        <p:nvSpPr>
+          <p:cNvPr id="9" name="TextBox 8">
+            <a:extLst>
+              <a:ext uri="{FF2B5EF4-FFF2-40B4-BE49-F238E27FC236}">
+                <a16:creationId xmlns:a16="http://schemas.microsoft.com/office/drawing/2014/main" id="{F60DBBAB-20A1-4CD4-A5BC-F57CADF2AD42}"/>
+              </a:ext>
+            </a:extLst>
+          </p:cNvPr>
+          <p:cNvSpPr txBox="1"/>
+          <p:nvPr/>
+        </p:nvSpPr>
+        <p:spPr>
+          <a:xfrm>
+            <a:off x="4319456" y="6441429"/>
+            <a:ext cx="7872544" cy="246221"/>
+          </a:xfrm>
+          <a:prstGeom prst="rect">
+            <a:avLst/>
+          </a:prstGeom>
+          <a:noFill/>
+        </p:spPr>
+        <p:txBody>
+          <a:bodyPr wrap="square" rtlCol="0">
+            <a:spAutoFit/>
+          </a:bodyPr>
+          <a:lstStyle/>
+          <a:p>
+            <a:pPr lvl="1"/>
+            <a:r>
+              <a:rPr lang="en-US" sz="1000" b="1" dirty="0"/>
+              <a:t>* NA's in the result sets are kept separately as it's not logical to add them in any of the time bin, unless otherwise specified</a:t>
+            </a:r>
+          </a:p>
+        </p:txBody>
+      </p:sp>
     </p:spTree>
     <p:extLst>
       <p:ext uri="{BB962C8B-B14F-4D97-AF65-F5344CB8AC3E}">
@@ -6767,7 +6950,7 @@
         <p:spPr>
           <a:xfrm>
             <a:off x="196206" y="1797891"/>
-            <a:ext cx="11799587" cy="2000548"/>
+            <a:ext cx="11799587" cy="1785104"/>
           </a:xfrm>
           <a:prstGeom prst="rect">
             <a:avLst/>
@@ -6794,23 +6977,10 @@
           </a:p>
           <a:p>
             <a:pPr lvl="1"/>
-            <a:r>
-              <a:rPr lang="en-US" sz="1400" b="1" dirty="0"/>
-              <a:t>c)	Using this information, find the total amount collected for all of the fines. State the code which has the highest total collection. </a:t>
-            </a:r>
+            <a:endParaRPr lang="en-US" sz="1400" b="1" dirty="0"/>
           </a:p>
           <a:p>
             <a:pPr lvl="1"/>
-            <a:r>
-              <a:rPr lang="en-US" sz="1400" b="1" dirty="0"/>
-              <a:t>d)	What can you intuitively infer from these findings?</a:t>
-            </a:r>
-          </a:p>
-          <a:p>
-            <a:pPr marL="800100" lvl="1" indent="-342900">
-              <a:buFontTx/>
-              <a:buAutoNum type="alphaLcParenR"/>
-            </a:pPr>
             <a:endParaRPr lang="en-US" sz="1400" b="1" dirty="0"/>
           </a:p>
           <a:p>
@@ -6823,10 +6993,503 @@
           </a:p>
         </p:txBody>
       </p:sp>
+      <p:pic>
+        <p:nvPicPr>
+          <p:cNvPr id="2" name="Picture 1">
+            <a:extLst>
+              <a:ext uri="{FF2B5EF4-FFF2-40B4-BE49-F238E27FC236}">
+                <a16:creationId xmlns:a16="http://schemas.microsoft.com/office/drawing/2014/main" id="{5D259B8A-BA8E-44C0-BB3A-A91B13BDB92E}"/>
+              </a:ext>
+            </a:extLst>
+          </p:cNvPr>
+          <p:cNvPicPr>
+            <a:picLocks noChangeAspect="1"/>
+          </p:cNvPicPr>
+          <p:nvPr/>
+        </p:nvPicPr>
+        <p:blipFill>
+          <a:blip r:embed="rId3"/>
+          <a:stretch>
+            <a:fillRect/>
+          </a:stretch>
+        </p:blipFill>
+        <p:spPr>
+          <a:xfrm>
+            <a:off x="1295843" y="3429000"/>
+            <a:ext cx="9791700" cy="1466850"/>
+          </a:xfrm>
+          <a:prstGeom prst="rect">
+            <a:avLst/>
+          </a:prstGeom>
+        </p:spPr>
+      </p:pic>
     </p:spTree>
     <p:extLst>
       <p:ext uri="{BB962C8B-B14F-4D97-AF65-F5344CB8AC3E}">
         <p14:creationId xmlns:p14="http://schemas.microsoft.com/office/powerpoint/2010/main" val="2075955123"/>
+      </p:ext>
+    </p:extLst>
+  </p:cSld>
+  <p:clrMapOvr>
+    <a:masterClrMapping/>
+  </p:clrMapOvr>
+</p:sld>
+</file>
+
+<file path=ppt/slides/slide21.xml><?xml version="1.0" encoding="utf-8"?>
+<p:sld xmlns:a="http://schemas.openxmlformats.org/drawingml/2006/main" xmlns:r="http://schemas.openxmlformats.org/officeDocument/2006/relationships" xmlns:p="http://schemas.openxmlformats.org/presentationml/2006/main">
+  <p:cSld>
+    <p:spTree>
+      <p:nvGrpSpPr>
+        <p:cNvPr id="1" name=""/>
+        <p:cNvGrpSpPr/>
+        <p:nvPr/>
+      </p:nvGrpSpPr>
+      <p:grpSpPr>
+        <a:xfrm>
+          <a:off x="0" y="0"/>
+          <a:ext cx="0" cy="0"/>
+          <a:chOff x="0" y="0"/>
+          <a:chExt cx="0" cy="0"/>
+        </a:xfrm>
+      </p:grpSpPr>
+      <p:grpSp>
+        <p:nvGrpSpPr>
+          <p:cNvPr id="11" name="Group 10">
+            <a:extLst>
+              <a:ext uri="{FF2B5EF4-FFF2-40B4-BE49-F238E27FC236}">
+                <a16:creationId xmlns:a16="http://schemas.microsoft.com/office/drawing/2014/main" id="{EBBA25A6-360E-4B6F-B6E1-CF2014CF9962}"/>
+              </a:ext>
+            </a:extLst>
+          </p:cNvPr>
+          <p:cNvGrpSpPr/>
+          <p:nvPr/>
+        </p:nvGrpSpPr>
+        <p:grpSpPr>
+          <a:xfrm>
+            <a:off x="0" y="990600"/>
+            <a:ext cx="12192000" cy="807291"/>
+            <a:chOff x="0" y="895350"/>
+            <a:chExt cx="12192000" cy="807291"/>
+          </a:xfrm>
+        </p:grpSpPr>
+        <p:pic>
+          <p:nvPicPr>
+            <p:cNvPr id="12" name="Picture 11">
+              <a:extLst>
+                <a:ext uri="{FF2B5EF4-FFF2-40B4-BE49-F238E27FC236}">
+                  <a16:creationId xmlns:a16="http://schemas.microsoft.com/office/drawing/2014/main" id="{1152C58B-7A3D-453B-BEF5-0D6A80241D16}"/>
+                </a:ext>
+              </a:extLst>
+            </p:cNvPr>
+            <p:cNvPicPr>
+              <a:picLocks noChangeAspect="1"/>
+            </p:cNvPicPr>
+            <p:nvPr/>
+          </p:nvPicPr>
+          <p:blipFill>
+            <a:blip r:embed="rId2">
+              <a:extLst>
+                <a:ext uri="{28A0092B-C50C-407E-A947-70E740481C1C}">
+                  <a14:useLocalDpi xmlns:a14="http://schemas.microsoft.com/office/drawing/2010/main" val="0"/>
+                </a:ext>
+              </a:extLst>
+            </a:blip>
+            <a:stretch>
+              <a:fillRect/>
+            </a:stretch>
+          </p:blipFill>
+          <p:spPr>
+            <a:xfrm>
+              <a:off x="0" y="895350"/>
+              <a:ext cx="12192000" cy="807291"/>
+            </a:xfrm>
+            <a:prstGeom prst="rect">
+              <a:avLst/>
+            </a:prstGeom>
+          </p:spPr>
+        </p:pic>
+        <p:sp>
+          <p:nvSpPr>
+            <p:cNvPr id="13" name="Rectangle 12">
+              <a:extLst>
+                <a:ext uri="{FF2B5EF4-FFF2-40B4-BE49-F238E27FC236}">
+                  <a16:creationId xmlns:a16="http://schemas.microsoft.com/office/drawing/2014/main" id="{CF7573B2-FDB7-41CD-8FE1-311DF7F4E7B3}"/>
+                </a:ext>
+              </a:extLst>
+            </p:cNvPr>
+            <p:cNvSpPr/>
+            <p:nvPr/>
+          </p:nvSpPr>
+          <p:spPr>
+            <a:xfrm>
+              <a:off x="210706" y="1148643"/>
+              <a:ext cx="3526415" cy="553998"/>
+            </a:xfrm>
+            <a:prstGeom prst="rect">
+              <a:avLst/>
+            </a:prstGeom>
+          </p:spPr>
+          <p:txBody>
+            <a:bodyPr wrap="none">
+              <a:spAutoFit/>
+            </a:bodyPr>
+            <a:lstStyle/>
+            <a:p>
+              <a:r>
+                <a:rPr lang="en-US" sz="3000" b="1" dirty="0">
+                  <a:solidFill>
+                    <a:schemeClr val="bg1"/>
+                  </a:solidFill>
+                  <a:latin typeface="Lato" charset="0"/>
+                </a:rPr>
+                <a:t>Aggregation Tasks</a:t>
+              </a:r>
+              <a:endParaRPr lang="en-US" sz="2400" b="1" dirty="0">
+                <a:solidFill>
+                  <a:schemeClr val="bg1"/>
+                </a:solidFill>
+                <a:latin typeface="Lato" charset="0"/>
+              </a:endParaRPr>
+            </a:p>
+          </p:txBody>
+        </p:sp>
+      </p:grpSp>
+      <p:sp>
+        <p:nvSpPr>
+          <p:cNvPr id="8" name="TextBox 7">
+            <a:extLst>
+              <a:ext uri="{FF2B5EF4-FFF2-40B4-BE49-F238E27FC236}">
+                <a16:creationId xmlns:a16="http://schemas.microsoft.com/office/drawing/2014/main" id="{C4728C7A-92DB-470B-B9B8-52D86CEDDDF8}"/>
+              </a:ext>
+            </a:extLst>
+          </p:cNvPr>
+          <p:cNvSpPr txBox="1"/>
+          <p:nvPr/>
+        </p:nvSpPr>
+        <p:spPr>
+          <a:xfrm>
+            <a:off x="196206" y="1797891"/>
+            <a:ext cx="11799587" cy="1631216"/>
+          </a:xfrm>
+          <a:prstGeom prst="rect">
+            <a:avLst/>
+          </a:prstGeom>
+          <a:noFill/>
+        </p:spPr>
+        <p:txBody>
+          <a:bodyPr wrap="square" rtlCol="0">
+            <a:spAutoFit/>
+          </a:bodyPr>
+          <a:lstStyle/>
+          <a:p>
+            <a:pPr marL="342900" indent="-342900">
+              <a:buAutoNum type="arabicPeriod" startAt="7"/>
+            </a:pPr>
+            <a:r>
+              <a:rPr lang="en-US" b="1" dirty="0"/>
+              <a:t>  The fines collected from all the parking violation constitute a revenue source for the NYC police department. Let’s 	take an example of estimating that for the 3 most commonly occurring codes.</a:t>
+            </a:r>
+          </a:p>
+          <a:p>
+            <a:pPr marL="342900" indent="-342900">
+              <a:buAutoNum type="arabicPeriod" startAt="7"/>
+            </a:pPr>
+            <a:endParaRPr lang="en-US" b="1" dirty="0"/>
+          </a:p>
+          <a:p>
+            <a:pPr lvl="1"/>
+            <a:r>
+              <a:rPr lang="en-US" sz="1400" b="1" dirty="0"/>
+              <a:t>c)	Using this information, find the total amount collected for all of the fines. State the code which has the highest total collection. </a:t>
+            </a:r>
+          </a:p>
+          <a:p>
+            <a:pPr marL="800100" lvl="1" indent="-342900">
+              <a:buFontTx/>
+              <a:buAutoNum type="alphaLcParenR"/>
+            </a:pPr>
+            <a:endParaRPr lang="en-US" sz="1400" b="1" dirty="0"/>
+          </a:p>
+          <a:p>
+            <a:pPr marL="800100" lvl="1" indent="-342900">
+              <a:buAutoNum type="alphaLcParenR"/>
+            </a:pPr>
+            <a:endParaRPr lang="en-US" b="1" dirty="0">
+              <a:latin typeface="Lato"/>
+            </a:endParaRPr>
+          </a:p>
+        </p:txBody>
+      </p:sp>
+      <p:sp>
+        <p:nvSpPr>
+          <p:cNvPr id="6" name="TextBox 5">
+            <a:extLst>
+              <a:ext uri="{FF2B5EF4-FFF2-40B4-BE49-F238E27FC236}">
+                <a16:creationId xmlns:a16="http://schemas.microsoft.com/office/drawing/2014/main" id="{43143C86-0B79-4544-8D01-D7F4C5A39DCA}"/>
+              </a:ext>
+            </a:extLst>
+          </p:cNvPr>
+          <p:cNvSpPr txBox="1"/>
+          <p:nvPr/>
+        </p:nvSpPr>
+        <p:spPr>
+          <a:xfrm>
+            <a:off x="196205" y="4684699"/>
+            <a:ext cx="11799587" cy="2092881"/>
+          </a:xfrm>
+          <a:prstGeom prst="rect">
+            <a:avLst/>
+          </a:prstGeom>
+          <a:noFill/>
+        </p:spPr>
+        <p:txBody>
+          <a:bodyPr wrap="square" rtlCol="0">
+            <a:spAutoFit/>
+          </a:bodyPr>
+          <a:lstStyle/>
+          <a:p>
+            <a:pPr marL="800100" lvl="1" indent="-342900">
+              <a:buAutoNum type="alphaLcParenR" startAt="4"/>
+            </a:pPr>
+            <a:r>
+              <a:rPr lang="en-US" sz="1400" b="1" dirty="0"/>
+              <a:t>What can you intuitively infer from these findings?</a:t>
+            </a:r>
+          </a:p>
+          <a:p>
+            <a:pPr marL="800100" lvl="1" indent="-342900">
+              <a:buAutoNum type="alphaLcParenR" startAt="4"/>
+            </a:pPr>
+            <a:endParaRPr lang="en-US" sz="1400" b="1" dirty="0"/>
+          </a:p>
+          <a:p>
+            <a:pPr lvl="2"/>
+            <a:r>
+              <a:rPr lang="en-US" sz="1400" b="1" dirty="0"/>
+              <a:t>Top Violation by count in 3 years is with code 21 which is "Street Cleaning: No parking where parking is not allowed by sign, street marking or traffic control device. but max revenue is with code 14 which has higher fine for issue "Street Cleaning: No parking where parking is not allowed by sign, street marking or traffic control device."</a:t>
+            </a:r>
+          </a:p>
+          <a:p>
+            <a:pPr marL="800100" lvl="1" indent="-342900">
+              <a:buAutoNum type="alphaLcParenR" startAt="4"/>
+            </a:pPr>
+            <a:endParaRPr lang="en-US" sz="1400" b="1" dirty="0"/>
+          </a:p>
+          <a:p>
+            <a:pPr marL="800100" lvl="1" indent="-342900">
+              <a:buAutoNum type="alphaLcParenR" startAt="4"/>
+            </a:pPr>
+            <a:endParaRPr lang="en-US" sz="1400" b="1" dirty="0"/>
+          </a:p>
+          <a:p>
+            <a:pPr marL="800100" lvl="1" indent="-342900">
+              <a:buFontTx/>
+              <a:buAutoNum type="alphaLcParenR"/>
+            </a:pPr>
+            <a:endParaRPr lang="en-US" sz="1400" b="1" dirty="0"/>
+          </a:p>
+          <a:p>
+            <a:pPr marL="800100" lvl="1" indent="-342900">
+              <a:buAutoNum type="alphaLcParenR"/>
+            </a:pPr>
+            <a:endParaRPr lang="en-US" b="1" dirty="0">
+              <a:latin typeface="Lato"/>
+            </a:endParaRPr>
+          </a:p>
+        </p:txBody>
+      </p:sp>
+      <p:pic>
+        <p:nvPicPr>
+          <p:cNvPr id="3" name="Picture 2">
+            <a:extLst>
+              <a:ext uri="{FF2B5EF4-FFF2-40B4-BE49-F238E27FC236}">
+                <a16:creationId xmlns:a16="http://schemas.microsoft.com/office/drawing/2014/main" id="{7C492017-D139-4CB4-A0AC-FCA06D106F4C}"/>
+              </a:ext>
+            </a:extLst>
+          </p:cNvPr>
+          <p:cNvPicPr>
+            <a:picLocks noChangeAspect="1"/>
+          </p:cNvPicPr>
+          <p:nvPr/>
+        </p:nvPicPr>
+        <p:blipFill>
+          <a:blip r:embed="rId3"/>
+          <a:stretch>
+            <a:fillRect/>
+          </a:stretch>
+        </p:blipFill>
+        <p:spPr>
+          <a:xfrm>
+            <a:off x="1973913" y="3102923"/>
+            <a:ext cx="7820025" cy="1133475"/>
+          </a:xfrm>
+          <a:prstGeom prst="rect">
+            <a:avLst/>
+          </a:prstGeom>
+        </p:spPr>
+      </p:pic>
+    </p:spTree>
+    <p:extLst>
+      <p:ext uri="{BB962C8B-B14F-4D97-AF65-F5344CB8AC3E}">
+        <p14:creationId xmlns:p14="http://schemas.microsoft.com/office/powerpoint/2010/main" val="3153085018"/>
+      </p:ext>
+    </p:extLst>
+  </p:cSld>
+  <p:clrMapOvr>
+    <a:masterClrMapping/>
+  </p:clrMapOvr>
+</p:sld>
+</file>
+
+<file path=ppt/slides/slide22.xml><?xml version="1.0" encoding="utf-8"?>
+<p:sld xmlns:a="http://schemas.openxmlformats.org/drawingml/2006/main" xmlns:r="http://schemas.openxmlformats.org/officeDocument/2006/relationships" xmlns:p="http://schemas.openxmlformats.org/presentationml/2006/main">
+  <p:cSld>
+    <p:spTree>
+      <p:nvGrpSpPr>
+        <p:cNvPr id="1" name=""/>
+        <p:cNvGrpSpPr/>
+        <p:nvPr/>
+      </p:nvGrpSpPr>
+      <p:grpSpPr>
+        <a:xfrm>
+          <a:off x="0" y="0"/>
+          <a:ext cx="0" cy="0"/>
+          <a:chOff x="0" y="0"/>
+          <a:chExt cx="0" cy="0"/>
+        </a:xfrm>
+      </p:grpSpPr>
+      <p:sp>
+        <p:nvSpPr>
+          <p:cNvPr id="3" name="Subtitle 2"/>
+          <p:cNvSpPr>
+            <a:spLocks noGrp="1"/>
+          </p:cNvSpPr>
+          <p:nvPr>
+            <p:ph type="subTitle" idx="1"/>
+          </p:nvPr>
+        </p:nvSpPr>
+        <p:spPr>
+          <a:xfrm>
+            <a:off x="5760542" y="4811430"/>
+            <a:ext cx="6138856" cy="1531917"/>
+          </a:xfrm>
+        </p:spPr>
+        <p:txBody>
+          <a:bodyPr>
+            <a:normAutofit/>
+          </a:bodyPr>
+          <a:lstStyle/>
+          <a:p>
+            <a:pPr algn="r"/>
+            <a:r>
+              <a:rPr lang="en-IN" sz="1800" dirty="0">
+                <a:latin typeface="Lato" panose="020F0502020204030203"/>
+              </a:rPr>
+              <a:t>Merin Jose</a:t>
+            </a:r>
+          </a:p>
+          <a:p>
+            <a:pPr algn="r"/>
+            <a:r>
+              <a:rPr lang="en-IN" sz="1800" dirty="0">
+                <a:latin typeface="Lato" panose="020F0502020204030203"/>
+              </a:rPr>
+              <a:t>Suresh </a:t>
+            </a:r>
+            <a:r>
+              <a:rPr lang="en-IN" sz="1800" dirty="0" err="1">
+                <a:latin typeface="Lato" panose="020F0502020204030203"/>
+              </a:rPr>
+              <a:t>Balla</a:t>
+            </a:r>
+            <a:endParaRPr lang="en-IN" sz="1800" dirty="0">
+              <a:latin typeface="Lato" panose="020F0502020204030203"/>
+            </a:endParaRPr>
+          </a:p>
+          <a:p>
+            <a:pPr algn="r"/>
+            <a:r>
+              <a:rPr lang="en-IN" sz="1800" dirty="0">
+                <a:latin typeface="Lato" panose="020F0502020204030203"/>
+              </a:rPr>
+              <a:t>Deepak </a:t>
+            </a:r>
+            <a:r>
+              <a:rPr lang="en-IN" sz="1800" dirty="0" err="1">
+                <a:latin typeface="Lato" panose="020F0502020204030203"/>
+              </a:rPr>
+              <a:t>Aneja</a:t>
+            </a:r>
+            <a:endParaRPr lang="en-IN" sz="1800" dirty="0">
+              <a:latin typeface="Lato" panose="020F0502020204030203"/>
+            </a:endParaRPr>
+          </a:p>
+          <a:p>
+            <a:pPr algn="r"/>
+            <a:r>
+              <a:rPr lang="en-IN" sz="1800" dirty="0">
+                <a:latin typeface="Lato" panose="020F0502020204030203"/>
+              </a:rPr>
+              <a:t>Fayiz Mayam Veettil</a:t>
+            </a:r>
+          </a:p>
+          <a:p>
+            <a:pPr marL="457200" indent="-457200" algn="l">
+              <a:buFont typeface="+mj-lt"/>
+              <a:buAutoNum type="arabicPeriod"/>
+            </a:pPr>
+            <a:endParaRPr lang="en-IN" sz="1800" dirty="0"/>
+          </a:p>
+        </p:txBody>
+      </p:sp>
+      <p:sp>
+        <p:nvSpPr>
+          <p:cNvPr id="7" name="Title 1">
+            <a:extLst>
+              <a:ext uri="{FF2B5EF4-FFF2-40B4-BE49-F238E27FC236}">
+                <a16:creationId xmlns:a16="http://schemas.microsoft.com/office/drawing/2014/main" id="{06ED631A-0337-465F-8039-C7101C9480FA}"/>
+              </a:ext>
+            </a:extLst>
+          </p:cNvPr>
+          <p:cNvSpPr>
+            <a:spLocks noGrp="1"/>
+          </p:cNvSpPr>
+          <p:nvPr>
+            <p:ph type="ctrTitle"/>
+          </p:nvPr>
+        </p:nvSpPr>
+        <p:spPr>
+          <a:xfrm>
+            <a:off x="1391478" y="1438275"/>
+            <a:ext cx="9144000" cy="2100056"/>
+          </a:xfrm>
+        </p:spPr>
+        <p:txBody>
+          <a:bodyPr>
+            <a:normAutofit/>
+          </a:bodyPr>
+          <a:lstStyle/>
+          <a:p>
+            <a:pPr>
+              <a:lnSpc>
+                <a:spcPct val="150000"/>
+              </a:lnSpc>
+            </a:pPr>
+            <a:r>
+              <a:rPr lang="en-US" sz="3200" b="1" dirty="0"/>
+              <a:t>Thanks</a:t>
+            </a:r>
+            <a:endParaRPr lang="en-IN" sz="2400" dirty="0">
+              <a:latin typeface="Lato" panose="020F0502020204030203"/>
+            </a:endParaRPr>
+          </a:p>
+        </p:txBody>
+      </p:sp>
+    </p:spTree>
+    <p:extLst>
+      <p:ext uri="{BB962C8B-B14F-4D97-AF65-F5344CB8AC3E}">
+        <p14:creationId xmlns:p14="http://schemas.microsoft.com/office/powerpoint/2010/main" val="177390757"/>
       </p:ext>
     </p:extLst>
   </p:cSld>
@@ -6904,7 +7567,7 @@
         <p:spPr>
           <a:xfrm>
             <a:off x="400051" y="1955934"/>
-            <a:ext cx="11020424" cy="4278094"/>
+            <a:ext cx="9631972" cy="3832139"/>
           </a:xfrm>
           <a:prstGeom prst="rect">
             <a:avLst/>
@@ -6965,7 +7628,7 @@
             </a:pPr>
             <a:r>
               <a:rPr lang="en-US" sz="1600" b="1" dirty="0"/>
-              <a:t>2015, 2016 and 2017 data set are used for analysis</a:t>
+              <a:t>2015, 2016 and 2017 data sets are used for analysis</a:t>
             </a:r>
           </a:p>
           <a:p>
@@ -6978,7 +7641,7 @@
             </a:pPr>
             <a:r>
               <a:rPr lang="en-US" sz="1600" b="1" dirty="0"/>
-              <a:t>2018 dataset lacks 8 columns that are included in the other 2 datasets</a:t>
+              <a:t>Total 6.6 GB of data across all three years</a:t>
             </a:r>
           </a:p>
           <a:p>
@@ -6991,7 +7654,7 @@
             </a:pPr>
             <a:r>
               <a:rPr lang="en-US" sz="1600" b="1" dirty="0"/>
-              <a:t>~10 M records per year</a:t>
+              <a:t>The files are roughly organized by fiscal year (July 1 - June 30) of NYC government, hence all the analysis done based on fiscal year and each metric compared across the 3 years. </a:t>
             </a:r>
           </a:p>
           <a:p>
@@ -7004,33 +7667,7 @@
             </a:pPr>
             <a:r>
               <a:rPr lang="en-US" sz="1600" b="1" dirty="0"/>
-              <a:t>Total 6.6 GB of data across all three years</a:t>
-            </a:r>
-          </a:p>
-          <a:p>
-            <a:pPr marL="742950" lvl="1" indent="-285750">
-              <a:lnSpc>
-                <a:spcPct val="150000"/>
-              </a:lnSpc>
-              <a:buFont typeface="Courier New" panose="02070309020205020404" pitchFamily="49" charset="0"/>
-              <a:buChar char="o"/>
-            </a:pPr>
-            <a:r>
-              <a:rPr lang="en-US" sz="1600" b="1" dirty="0"/>
-              <a:t>The files are roughly organized by fiscal year (July 1 - June 30)</a:t>
-            </a:r>
-          </a:p>
-          <a:p>
-            <a:pPr marL="742950" lvl="1" indent="-285750">
-              <a:lnSpc>
-                <a:spcPct val="150000"/>
-              </a:lnSpc>
-              <a:buFont typeface="Courier New" panose="02070309020205020404" pitchFamily="49" charset="0"/>
-              <a:buChar char="o"/>
-            </a:pPr>
-            <a:r>
-              <a:rPr lang="en-US" sz="1600" b="1" dirty="0"/>
-              <a:t>All the analysis done for 3 different years and each metric compared across the 3 years. </a:t>
+              <a:t>External data from nyc.gov for Violation Code Fines are used for revenue analysis</a:t>
             </a:r>
           </a:p>
           <a:p>
@@ -8085,7 +8722,7 @@
         <p:spPr>
           <a:xfrm>
             <a:off x="140677" y="1925515"/>
-            <a:ext cx="11201400" cy="2431435"/>
+            <a:ext cx="11201400" cy="4940135"/>
           </a:xfrm>
           <a:prstGeom prst="rect">
             <a:avLst/>
@@ -8123,7 +8760,7 @@
               <a:rPr lang="en-US" sz="1600" dirty="0">
                 <a:latin typeface="Lato"/>
               </a:rPr>
-              <a:t>Check for duplicate records on Summons Data</a:t>
+              <a:t>Check for duplicate records on Summons Number</a:t>
             </a:r>
           </a:p>
           <a:p>
@@ -8155,6 +8792,106 @@
               </a:rPr>
               <a:t>Status of data cleaning</a:t>
             </a:r>
+          </a:p>
+          <a:p>
+            <a:pPr marL="1200150" lvl="2" indent="-285750">
+              <a:lnSpc>
+                <a:spcPct val="150000"/>
+              </a:lnSpc>
+              <a:buFont typeface="Courier New" panose="02070309020205020404" pitchFamily="49" charset="0"/>
+              <a:buChar char="o"/>
+            </a:pPr>
+            <a:r>
+              <a:rPr lang="en-US" sz="1600" dirty="0"/>
+              <a:t> 2017 dataset lacks 8 columns that are included in the other 2 datasets</a:t>
+            </a:r>
+          </a:p>
+          <a:p>
+            <a:pPr marL="1200150" lvl="2" indent="-285750">
+              <a:lnSpc>
+                <a:spcPct val="150000"/>
+              </a:lnSpc>
+              <a:buFont typeface="Courier New" panose="02070309020205020404" pitchFamily="49" charset="0"/>
+              <a:buChar char="o"/>
+            </a:pPr>
+            <a:r>
+              <a:rPr lang="en-US" sz="1600" dirty="0"/>
+              <a:t>Each files contains data from current year July 1</a:t>
+            </a:r>
+            <a:r>
+              <a:rPr lang="en-US" sz="1600" baseline="30000" dirty="0"/>
+              <a:t>st</a:t>
+            </a:r>
+            <a:r>
+              <a:rPr lang="en-US" sz="1600" dirty="0"/>
+              <a:t>  to June 30</a:t>
+            </a:r>
+            <a:r>
+              <a:rPr lang="en-US" sz="1600" baseline="30000" dirty="0"/>
+              <a:t>th</a:t>
+            </a:r>
+            <a:r>
+              <a:rPr lang="en-US" sz="1600" dirty="0"/>
+              <a:t> next year</a:t>
+            </a:r>
+          </a:p>
+          <a:p>
+            <a:pPr marL="1200150" lvl="2" indent="-285750">
+              <a:lnSpc>
+                <a:spcPct val="150000"/>
+              </a:lnSpc>
+              <a:buFont typeface="Courier New" panose="02070309020205020404" pitchFamily="49" charset="0"/>
+              <a:buChar char="o"/>
+            </a:pPr>
+            <a:r>
+              <a:rPr lang="en-US" sz="1600" dirty="0"/>
+              <a:t>~10 M records per year</a:t>
+            </a:r>
+          </a:p>
+          <a:p>
+            <a:pPr marL="1200150" lvl="2" indent="-285750">
+              <a:lnSpc>
+                <a:spcPct val="150000"/>
+              </a:lnSpc>
+              <a:buFont typeface="Courier New" panose="02070309020205020404" pitchFamily="49" charset="0"/>
+              <a:buChar char="o"/>
+            </a:pPr>
+            <a:r>
+              <a:rPr lang="en-US" sz="1600" dirty="0"/>
+              <a:t>857,977 number of records found duplicated and cleaned in 2015 data file</a:t>
+            </a:r>
+          </a:p>
+          <a:p>
+            <a:pPr marL="1200150" lvl="2" indent="-285750">
+              <a:lnSpc>
+                <a:spcPct val="150000"/>
+              </a:lnSpc>
+              <a:buFont typeface="Courier New" panose="02070309020205020404" pitchFamily="49" charset="0"/>
+              <a:buChar char="o"/>
+            </a:pPr>
+            <a:endParaRPr lang="en-US" sz="1600" dirty="0"/>
+          </a:p>
+          <a:p>
+            <a:pPr marL="1200150" lvl="2" indent="-285750">
+              <a:lnSpc>
+                <a:spcPct val="150000"/>
+              </a:lnSpc>
+              <a:buFont typeface="Courier New" panose="02070309020205020404" pitchFamily="49" charset="0"/>
+              <a:buChar char="o"/>
+            </a:pPr>
+            <a:endParaRPr lang="en-US" sz="1600" dirty="0"/>
+          </a:p>
+          <a:p>
+            <a:pPr marL="1200150" lvl="2" indent="-285750">
+              <a:lnSpc>
+                <a:spcPct val="150000"/>
+              </a:lnSpc>
+              <a:buFont typeface="Courier New" panose="02070309020205020404" pitchFamily="49" charset="0"/>
+              <a:buChar char="o"/>
+            </a:pPr>
+            <a:endParaRPr lang="en-US" sz="1600" dirty="0">
+              <a:latin typeface="Lato"/>
+            </a:endParaRPr>
           </a:p>
           <a:p>
             <a:pPr marL="742950" lvl="1" indent="-285750">

</xml_diff>